<commit_message>
added meet the team
</commit_message>
<xml_diff>
--- a/project_presentation final.pptx
+++ b/project_presentation final.pptx
@@ -5,7 +5,7 @@
     <p:sldMasterId id="2147483648" r:id="rId1"/>
   </p:sldMasterIdLst>
   <p:notesMasterIdLst>
-    <p:notesMasterId r:id="rId14"/>
+    <p:notesMasterId r:id="rId15"/>
   </p:notesMasterIdLst>
   <p:sldIdLst>
     <p:sldId id="256" r:id="rId2"/>
@@ -20,6 +20,7 @@
     <p:sldId id="280" r:id="rId11"/>
     <p:sldId id="281" r:id="rId12"/>
     <p:sldId id="282" r:id="rId13"/>
+    <p:sldId id="289" r:id="rId14"/>
   </p:sldIdLst>
   <p:sldSz cx="12192000" cy="6858000"/>
   <p:notesSz cx="6858000" cy="9144000"/>
@@ -1287,9 +1288,9 @@
   <dgm:cxnLst>
     <dgm:cxn modelId="{C0A76400-94BB-0F45-B65C-B5472CB631D8}" srcId="{67C907BF-4D7B-5A4B-A6D2-B0123FB5CCD1}" destId="{B32F5168-C7AD-5042-9C2A-DC929AE67FFA}" srcOrd="5" destOrd="0" parTransId="{F7BA0190-B1DB-8446-9919-3ABA7857C63E}" sibTransId="{8BB1B9C7-8B93-3C40-A0DE-E5F066DE0B03}"/>
     <dgm:cxn modelId="{278C242F-39A1-434D-B382-9893C573A76B}" type="presOf" srcId="{B32F5168-C7AD-5042-9C2A-DC929AE67FFA}" destId="{15D494E3-2A0F-904A-8B1A-813A3FD12DAF}" srcOrd="0" destOrd="0" presId="urn:microsoft.com/office/officeart/2005/8/layout/chevron2"/>
+    <dgm:cxn modelId="{96C2EC71-E320-1E47-9F7C-582D578EF579}" type="presOf" srcId="{593FEBA3-D17C-4647-9F21-7931379AFF8F}" destId="{7EA6254D-C245-D841-9868-4873F732D348}" srcOrd="0" destOrd="0" presId="urn:microsoft.com/office/officeart/2005/8/layout/chevron2"/>
     <dgm:cxn modelId="{56061554-5EA1-E04A-971A-C58C52735A27}" type="presOf" srcId="{B83226CD-9BCE-FB4E-9DA9-1080B2729E3E}" destId="{C7C5AB77-82B4-B648-BD11-209A4AE0B6E4}" srcOrd="0" destOrd="0" presId="urn:microsoft.com/office/officeart/2005/8/layout/chevron2"/>
     <dgm:cxn modelId="{F6383655-6503-A049-A45F-87058F656346}" srcId="{67C907BF-4D7B-5A4B-A6D2-B0123FB5CCD1}" destId="{593FEBA3-D17C-4647-9F21-7931379AFF8F}" srcOrd="1" destOrd="0" parTransId="{397F6FDF-B336-F440-9C17-36D3CA13B00B}" sibTransId="{E02D9CCD-F34C-AD45-AC4D-0B376E44B969}"/>
-    <dgm:cxn modelId="{96C2EC71-E320-1E47-9F7C-582D578EF579}" type="presOf" srcId="{593FEBA3-D17C-4647-9F21-7931379AFF8F}" destId="{7EA6254D-C245-D841-9868-4873F732D348}" srcOrd="0" destOrd="0" presId="urn:microsoft.com/office/officeart/2005/8/layout/chevron2"/>
     <dgm:cxn modelId="{9C64EA89-BBB5-0641-9116-2E21C8D65C89}" srcId="{67C907BF-4D7B-5A4B-A6D2-B0123FB5CCD1}" destId="{E8DE1C56-8079-8C49-BF68-539592316DCC}" srcOrd="4" destOrd="0" parTransId="{1EF2797A-21BE-844C-8488-38359DC51642}" sibTransId="{5E759286-31BC-6B49-8A22-5879E25A5ADB}"/>
     <dgm:cxn modelId="{4C9F7793-7616-FF4E-ACC0-F858B0F9DECF}" srcId="{67C907BF-4D7B-5A4B-A6D2-B0123FB5CCD1}" destId="{9DD20EE7-EEDA-3149-87C3-5EA5C36F04EF}" srcOrd="2" destOrd="0" parTransId="{F44BCD8D-7586-7845-AC7E-99E1FD6BBE1C}" sibTransId="{14A31638-9F11-4546-85B7-70353E7F474A}"/>
     <dgm:cxn modelId="{0286F2AC-5611-4E4B-8F32-8D8A0A25D0F1}" type="presOf" srcId="{0D97F71C-81AE-D14B-949D-98CBAD0D8D96}" destId="{9DE523B7-1797-3C42-8BF6-17E97D73779D}" srcOrd="0" destOrd="0" presId="urn:microsoft.com/office/officeart/2005/8/layout/chevron2"/>
@@ -3672,7 +3673,7 @@
           <a:p>
             <a:fld id="{7BB07668-3684-0247-BB64-7A66617D6687}" type="datetimeFigureOut">
               <a:rPr lang="en-US" smtClean="0"/>
-              <a:t>12/10/24</a:t>
+              <a:t>12/10/2024</a:t>
             </a:fld>
             <a:endParaRPr lang="en-US"/>
           </a:p>
@@ -5339,7 +5340,7 @@
           <a:p>
             <a:fld id="{2FE06052-50CA-B744-8BEC-FAC66263FC9E}" type="datetime1">
               <a:rPr lang="en-US" smtClean="0"/>
-              <a:t>12/10/24</a:t>
+              <a:t>12/10/2024</a:t>
             </a:fld>
             <a:endParaRPr lang="en-US"/>
           </a:p>
@@ -5547,7 +5548,7 @@
           <a:p>
             <a:fld id="{64C78ADA-2E9D-7C45-940B-3C89C14B33F9}" type="datetime1">
               <a:rPr lang="en-US" smtClean="0"/>
-              <a:t>12/10/24</a:t>
+              <a:t>12/10/2024</a:t>
             </a:fld>
             <a:endParaRPr lang="en-US"/>
           </a:p>
@@ -5760,7 +5761,7 @@
           <a:p>
             <a:fld id="{C22C2036-5155-C74D-81C2-EFD03851AE43}" type="datetime1">
               <a:rPr lang="en-US" smtClean="0"/>
-              <a:t>12/10/24</a:t>
+              <a:t>12/10/2024</a:t>
             </a:fld>
             <a:endParaRPr lang="en-US"/>
           </a:p>
@@ -5958,7 +5959,7 @@
           <a:p>
             <a:fld id="{6473172E-12FB-4A47-AA24-435286343A8F}" type="datetime1">
               <a:rPr lang="en-US" smtClean="0"/>
-              <a:t>12/10/24</a:t>
+              <a:t>12/10/2024</a:t>
             </a:fld>
             <a:endParaRPr lang="en-US"/>
           </a:p>
@@ -6240,7 +6241,7 @@
           <a:p>
             <a:fld id="{19248129-FCCE-AA46-9A02-27CF4071C94D}" type="datetime1">
               <a:rPr lang="en-US" smtClean="0"/>
-              <a:t>12/10/24</a:t>
+              <a:t>12/10/2024</a:t>
             </a:fld>
             <a:endParaRPr lang="en-US"/>
           </a:p>
@@ -6510,7 +6511,7 @@
           <a:p>
             <a:fld id="{BC82CEA2-659B-964B-AA48-4370F2392D30}" type="datetime1">
               <a:rPr lang="en-US" smtClean="0"/>
-              <a:t>12/10/24</a:t>
+              <a:t>12/10/2024</a:t>
             </a:fld>
             <a:endParaRPr lang="en-US"/>
           </a:p>
@@ -6927,7 +6928,7 @@
           <a:p>
             <a:fld id="{81124A4F-DF81-A643-950A-C4DEDB10298D}" type="datetime1">
               <a:rPr lang="en-US" smtClean="0"/>
-              <a:t>12/10/24</a:t>
+              <a:t>12/10/2024</a:t>
             </a:fld>
             <a:endParaRPr lang="en-US"/>
           </a:p>
@@ -7073,7 +7074,7 @@
           <a:p>
             <a:fld id="{F4DEF9D0-DB88-D84E-B59D-4377ABEF81DF}" type="datetime1">
               <a:rPr lang="en-US" smtClean="0"/>
-              <a:t>12/10/24</a:t>
+              <a:t>12/10/2024</a:t>
             </a:fld>
             <a:endParaRPr lang="en-US"/>
           </a:p>
@@ -7191,7 +7192,7 @@
           <a:p>
             <a:fld id="{068C271D-8763-F049-BBE5-2C853DDF229B}" type="datetime1">
               <a:rPr lang="en-US" smtClean="0"/>
-              <a:t>12/10/24</a:t>
+              <a:t>12/10/2024</a:t>
             </a:fld>
             <a:endParaRPr lang="en-US"/>
           </a:p>
@@ -7507,7 +7508,7 @@
           <a:p>
             <a:fld id="{2A51087F-1D88-DB47-94A8-EB65BC726D54}" type="datetime1">
               <a:rPr lang="en-US" smtClean="0"/>
-              <a:t>12/10/24</a:t>
+              <a:t>12/10/2024</a:t>
             </a:fld>
             <a:endParaRPr lang="en-US"/>
           </a:p>
@@ -7800,7 +7801,7 @@
           <a:p>
             <a:fld id="{A11C1556-B664-BD40-A394-A22AA75159F1}" type="datetime1">
               <a:rPr lang="en-US" smtClean="0"/>
-              <a:t>12/10/24</a:t>
+              <a:t>12/10/2024</a:t>
             </a:fld>
             <a:endParaRPr lang="en-US"/>
           </a:p>
@@ -8046,7 +8047,7 @@
           <a:p>
             <a:fld id="{C5AA4D09-1DB6-294F-9D03-B4815CE9E81F}" type="datetime1">
               <a:rPr lang="en-US" smtClean="0"/>
-              <a:t>12/10/24</a:t>
+              <a:t>12/10/2024</a:t>
             </a:fld>
             <a:endParaRPr lang="en-US" dirty="0"/>
           </a:p>
@@ -10143,6 +10144,267 @@
     <p:extLst>
       <p:ext uri="{BB962C8B-B14F-4D97-AF65-F5344CB8AC3E}">
         <p14:creationId xmlns:p14="http://schemas.microsoft.com/office/powerpoint/2010/main" val="2171007749"/>
+      </p:ext>
+    </p:extLst>
+  </p:cSld>
+  <p:clrMapOvr>
+    <a:masterClrMapping/>
+  </p:clrMapOvr>
+</p:sld>
+</file>
+
+<file path=ppt/slides/slide13.xml><?xml version="1.0" encoding="utf-8"?>
+<p:sld xmlns:a="http://schemas.openxmlformats.org/drawingml/2006/main" xmlns:r="http://schemas.openxmlformats.org/officeDocument/2006/relationships" xmlns:p="http://schemas.openxmlformats.org/presentationml/2006/main">
+  <p:cSld>
+    <p:spTree>
+      <p:nvGrpSpPr>
+        <p:cNvPr id="1" name=""/>
+        <p:cNvGrpSpPr/>
+        <p:nvPr/>
+      </p:nvGrpSpPr>
+      <p:grpSpPr>
+        <a:xfrm>
+          <a:off x="0" y="0"/>
+          <a:ext cx="0" cy="0"/>
+          <a:chOff x="0" y="0"/>
+          <a:chExt cx="0" cy="0"/>
+        </a:xfrm>
+      </p:grpSpPr>
+      <p:sp>
+        <p:nvSpPr>
+          <p:cNvPr id="2" name="Title 1">
+            <a:extLst>
+              <a:ext uri="{FF2B5EF4-FFF2-40B4-BE49-F238E27FC236}">
+                <a16:creationId xmlns:a16="http://schemas.microsoft.com/office/drawing/2014/main" id="{42BFBE2B-05FD-5E5F-95BA-5B687D6A9198}"/>
+              </a:ext>
+            </a:extLst>
+          </p:cNvPr>
+          <p:cNvSpPr>
+            <a:spLocks noGrp="1"/>
+          </p:cNvSpPr>
+          <p:nvPr>
+            <p:ph type="title"/>
+          </p:nvPr>
+        </p:nvSpPr>
+        <p:spPr/>
+        <p:txBody>
+          <a:bodyPr/>
+          <a:lstStyle/>
+          <a:p>
+            <a:r>
+              <a:rPr lang="en-US" dirty="0"/>
+              <a:t>Meet the Team</a:t>
+            </a:r>
+          </a:p>
+        </p:txBody>
+      </p:sp>
+      <p:pic>
+        <p:nvPicPr>
+          <p:cNvPr id="5" name="Content Placeholder 4" descr="A group of people with faces drawn on them&#10;&#10;Description automatically generated">
+            <a:extLst>
+              <a:ext uri="{FF2B5EF4-FFF2-40B4-BE49-F238E27FC236}">
+                <a16:creationId xmlns:a16="http://schemas.microsoft.com/office/drawing/2014/main" id="{25B8E691-264F-4BBC-6200-5BD41B811803}"/>
+              </a:ext>
+            </a:extLst>
+          </p:cNvPr>
+          <p:cNvPicPr>
+            <a:picLocks noGrp="1" noChangeAspect="1"/>
+          </p:cNvPicPr>
+          <p:nvPr>
+            <p:ph idx="1"/>
+          </p:nvPr>
+        </p:nvPicPr>
+        <p:blipFill>
+          <a:blip r:embed="rId2"/>
+          <a:srcRect r="34660" b="59358"/>
+          <a:stretch/>
+        </p:blipFill>
+        <p:spPr>
+          <a:xfrm>
+            <a:off x="1072901" y="1690688"/>
+            <a:ext cx="10046197" cy="4105275"/>
+          </a:xfrm>
+        </p:spPr>
+      </p:pic>
+      <p:sp>
+        <p:nvSpPr>
+          <p:cNvPr id="6" name="TextBox 5">
+            <a:extLst>
+              <a:ext uri="{FF2B5EF4-FFF2-40B4-BE49-F238E27FC236}">
+                <a16:creationId xmlns:a16="http://schemas.microsoft.com/office/drawing/2014/main" id="{013CD6D4-2254-D10F-D6AE-67284B52683F}"/>
+              </a:ext>
+            </a:extLst>
+          </p:cNvPr>
+          <p:cNvSpPr txBox="1"/>
+          <p:nvPr/>
+        </p:nvSpPr>
+        <p:spPr>
+          <a:xfrm>
+            <a:off x="1882651" y="2369920"/>
+            <a:ext cx="1752600" cy="646331"/>
+          </a:xfrm>
+          <a:prstGeom prst="rect">
+            <a:avLst/>
+          </a:prstGeom>
+          <a:noFill/>
+        </p:spPr>
+        <p:txBody>
+          <a:bodyPr wrap="square" rtlCol="0">
+            <a:spAutoFit/>
+          </a:bodyPr>
+          <a:lstStyle/>
+          <a:p>
+            <a:r>
+              <a:rPr lang="en-US" dirty="0"/>
+              <a:t>Joey: Head of DEI</a:t>
+            </a:r>
+          </a:p>
+        </p:txBody>
+      </p:sp>
+      <p:sp>
+        <p:nvSpPr>
+          <p:cNvPr id="7" name="TextBox 6">
+            <a:extLst>
+              <a:ext uri="{FF2B5EF4-FFF2-40B4-BE49-F238E27FC236}">
+                <a16:creationId xmlns:a16="http://schemas.microsoft.com/office/drawing/2014/main" id="{9F49AF9D-87C3-8EA8-6784-18156399DD43}"/>
+              </a:ext>
+            </a:extLst>
+          </p:cNvPr>
+          <p:cNvSpPr txBox="1"/>
+          <p:nvPr/>
+        </p:nvSpPr>
+        <p:spPr>
+          <a:xfrm>
+            <a:off x="3987800" y="2197100"/>
+            <a:ext cx="1752600" cy="646331"/>
+          </a:xfrm>
+          <a:prstGeom prst="rect">
+            <a:avLst/>
+          </a:prstGeom>
+          <a:noFill/>
+        </p:spPr>
+        <p:txBody>
+          <a:bodyPr wrap="square" rtlCol="0">
+            <a:spAutoFit/>
+          </a:bodyPr>
+          <a:lstStyle/>
+          <a:p>
+            <a:r>
+              <a:rPr lang="en-US" dirty="0"/>
+              <a:t>Zak: DEI Specialist</a:t>
+            </a:r>
+          </a:p>
+        </p:txBody>
+      </p:sp>
+      <p:sp>
+        <p:nvSpPr>
+          <p:cNvPr id="8" name="TextBox 7">
+            <a:extLst>
+              <a:ext uri="{FF2B5EF4-FFF2-40B4-BE49-F238E27FC236}">
+                <a16:creationId xmlns:a16="http://schemas.microsoft.com/office/drawing/2014/main" id="{644095EA-20A5-D40D-4DB0-AB0A84330A61}"/>
+              </a:ext>
+            </a:extLst>
+          </p:cNvPr>
+          <p:cNvSpPr txBox="1"/>
+          <p:nvPr/>
+        </p:nvSpPr>
+        <p:spPr>
+          <a:xfrm>
+            <a:off x="5508749" y="2284358"/>
+            <a:ext cx="1752600" cy="646331"/>
+          </a:xfrm>
+          <a:prstGeom prst="rect">
+            <a:avLst/>
+          </a:prstGeom>
+          <a:noFill/>
+        </p:spPr>
+        <p:txBody>
+          <a:bodyPr wrap="square" rtlCol="0">
+            <a:spAutoFit/>
+          </a:bodyPr>
+          <a:lstStyle/>
+          <a:p>
+            <a:r>
+              <a:rPr lang="en-US" dirty="0"/>
+              <a:t>Riccardo: Head of HR</a:t>
+            </a:r>
+          </a:p>
+        </p:txBody>
+      </p:sp>
+      <p:sp>
+        <p:nvSpPr>
+          <p:cNvPr id="9" name="TextBox 8">
+            <a:extLst>
+              <a:ext uri="{FF2B5EF4-FFF2-40B4-BE49-F238E27FC236}">
+                <a16:creationId xmlns:a16="http://schemas.microsoft.com/office/drawing/2014/main" id="{4526BFE5-1693-71E8-EF0D-23820BA9FAB0}"/>
+              </a:ext>
+            </a:extLst>
+          </p:cNvPr>
+          <p:cNvSpPr txBox="1"/>
+          <p:nvPr/>
+        </p:nvSpPr>
+        <p:spPr>
+          <a:xfrm>
+            <a:off x="7201050" y="2280461"/>
+            <a:ext cx="2052772" cy="646331"/>
+          </a:xfrm>
+          <a:prstGeom prst="rect">
+            <a:avLst/>
+          </a:prstGeom>
+          <a:noFill/>
+        </p:spPr>
+        <p:txBody>
+          <a:bodyPr wrap="square" rtlCol="0">
+            <a:spAutoFit/>
+          </a:bodyPr>
+          <a:lstStyle/>
+          <a:p>
+            <a:r>
+              <a:rPr lang="en-US" dirty="0"/>
+              <a:t>Jesse: Water Cooler Repairman</a:t>
+            </a:r>
+          </a:p>
+        </p:txBody>
+      </p:sp>
+      <p:sp>
+        <p:nvSpPr>
+          <p:cNvPr id="10" name="TextBox 9">
+            <a:extLst>
+              <a:ext uri="{FF2B5EF4-FFF2-40B4-BE49-F238E27FC236}">
+                <a16:creationId xmlns:a16="http://schemas.microsoft.com/office/drawing/2014/main" id="{9BDE0394-5784-37D5-7883-A93591B16637}"/>
+              </a:ext>
+            </a:extLst>
+          </p:cNvPr>
+          <p:cNvSpPr txBox="1"/>
+          <p:nvPr/>
+        </p:nvSpPr>
+        <p:spPr>
+          <a:xfrm>
+            <a:off x="9193523" y="2646919"/>
+            <a:ext cx="1752600" cy="369332"/>
+          </a:xfrm>
+          <a:prstGeom prst="rect">
+            <a:avLst/>
+          </a:prstGeom>
+          <a:noFill/>
+        </p:spPr>
+        <p:txBody>
+          <a:bodyPr wrap="square" rtlCol="0">
+            <a:spAutoFit/>
+          </a:bodyPr>
+          <a:lstStyle/>
+          <a:p>
+            <a:r>
+              <a:rPr lang="en-US" dirty="0"/>
+              <a:t>Nick: Intern</a:t>
+            </a:r>
+          </a:p>
+        </p:txBody>
+      </p:sp>
+    </p:spTree>
+    <p:extLst>
+      <p:ext uri="{BB962C8B-B14F-4D97-AF65-F5344CB8AC3E}">
+        <p14:creationId xmlns:p14="http://schemas.microsoft.com/office/powerpoint/2010/main" val="1383409906"/>
       </p:ext>
     </p:extLst>
   </p:cSld>

</xml_diff>